<commit_message>
04_Team_RayForge_Release_Technische-Präsentation.pptx : vorschau kapitel hinzugefügt -> noch nicht fertig da fehlt 1-2 bilder
</commit_message>
<xml_diff>
--- a/2. Präsentation/2.1 Präsentationsunterlagen/04_Team_RayForge_Release_Technische-Präsentation.pptx
+++ b/2. Präsentation/2.1 Präsentationsunterlagen/04_Team_RayForge_Release_Technische-Präsentation.pptx
@@ -6,7 +6,7 @@
     <p:sldMasterId id="2147483672" r:id="rId2"/>
   </p:sldMasterIdLst>
   <p:notesMasterIdLst>
-    <p:notesMasterId r:id="rId22"/>
+    <p:notesMasterId r:id="rId27"/>
   </p:notesMasterIdLst>
   <p:sldIdLst>
     <p:sldId id="279" r:id="rId3"/>
@@ -27,7 +27,12 @@
     <p:sldId id="283" r:id="rId18"/>
     <p:sldId id="285" r:id="rId19"/>
     <p:sldId id="286" r:id="rId20"/>
-    <p:sldId id="269" r:id="rId21"/>
+    <p:sldId id="302" r:id="rId21"/>
+    <p:sldId id="301" r:id="rId22"/>
+    <p:sldId id="304" r:id="rId23"/>
+    <p:sldId id="305" r:id="rId24"/>
+    <p:sldId id="303" r:id="rId25"/>
+    <p:sldId id="269" r:id="rId26"/>
   </p:sldIdLst>
   <p:sldSz cx="12192000" cy="6858000"/>
   <p:notesSz cx="6858000" cy="9144000"/>
@@ -9475,6 +9480,1962 @@
 <file path=ppt/slides/slide19.xml><?xml version="1.0" encoding="utf-8"?>
 <p:sld xmlns:a="http://schemas.openxmlformats.org/drawingml/2006/main" xmlns:r="http://schemas.openxmlformats.org/officeDocument/2006/relationships" xmlns:p="http://schemas.openxmlformats.org/presentationml/2006/main">
   <p:cSld>
+    <p:spTree>
+      <p:nvGrpSpPr>
+        <p:cNvPr id="1" name="">
+          <a:extLst>
+            <a:ext uri="{FF2B5EF4-FFF2-40B4-BE49-F238E27FC236}">
+              <a16:creationId xmlns:a16="http://schemas.microsoft.com/office/drawing/2014/main" id="{81659664-94FA-8486-D93A-729E8889B9FF}"/>
+            </a:ext>
+          </a:extLst>
+        </p:cNvPr>
+        <p:cNvGrpSpPr/>
+        <p:nvPr/>
+      </p:nvGrpSpPr>
+      <p:grpSpPr>
+        <a:xfrm>
+          <a:off x="0" y="0"/>
+          <a:ext cx="0" cy="0"/>
+          <a:chOff x="0" y="0"/>
+          <a:chExt cx="0" cy="0"/>
+        </a:xfrm>
+      </p:grpSpPr>
+      <p:sp>
+        <p:nvSpPr>
+          <p:cNvPr id="2" name="Rectangle 1">
+            <a:extLst>
+              <a:ext uri="{FF2B5EF4-FFF2-40B4-BE49-F238E27FC236}">
+                <a16:creationId xmlns:a16="http://schemas.microsoft.com/office/drawing/2014/main" id="{D35E4E30-7538-3A74-84C2-111FC299EA2A}"/>
+              </a:ext>
+            </a:extLst>
+          </p:cNvPr>
+          <p:cNvSpPr/>
+          <p:nvPr/>
+        </p:nvSpPr>
+        <p:spPr>
+          <a:xfrm>
+            <a:off x="111833" y="171039"/>
+            <a:ext cx="266697" cy="6479732"/>
+          </a:xfrm>
+          <a:prstGeom prst="rect">
+            <a:avLst/>
+          </a:prstGeom>
+          <a:ln>
+            <a:noFill/>
+          </a:ln>
+        </p:spPr>
+        <p:style>
+          <a:lnRef idx="2">
+            <a:schemeClr val="accent1">
+              <a:shade val="15000"/>
+            </a:schemeClr>
+          </a:lnRef>
+          <a:fillRef idx="1">
+            <a:schemeClr val="accent1"/>
+          </a:fillRef>
+          <a:effectRef idx="0">
+            <a:schemeClr val="accent1"/>
+          </a:effectRef>
+          <a:fontRef idx="minor">
+            <a:schemeClr val="lt1"/>
+          </a:fontRef>
+        </p:style>
+        <p:txBody>
+          <a:bodyPr rtlCol="0" anchor="ctr"/>
+          <a:lstStyle/>
+          <a:p>
+            <a:pPr algn="ctr"/>
+            <a:endParaRPr lang="de-DE" noProof="0" dirty="0"/>
+          </a:p>
+        </p:txBody>
+      </p:sp>
+      <p:sp>
+        <p:nvSpPr>
+          <p:cNvPr id="3" name="Rectangle 2">
+            <a:extLst>
+              <a:ext uri="{FF2B5EF4-FFF2-40B4-BE49-F238E27FC236}">
+                <a16:creationId xmlns:a16="http://schemas.microsoft.com/office/drawing/2014/main" id="{C6F774C1-C8B9-A51B-E68E-511FB3589198}"/>
+              </a:ext>
+            </a:extLst>
+          </p:cNvPr>
+          <p:cNvSpPr/>
+          <p:nvPr/>
+        </p:nvSpPr>
+        <p:spPr>
+          <a:xfrm>
+            <a:off x="111833" y="6447755"/>
+            <a:ext cx="2292347" cy="300771"/>
+          </a:xfrm>
+          <a:prstGeom prst="rect">
+            <a:avLst/>
+          </a:prstGeom>
+          <a:ln>
+            <a:noFill/>
+          </a:ln>
+        </p:spPr>
+        <p:style>
+          <a:lnRef idx="2">
+            <a:schemeClr val="accent1">
+              <a:shade val="15000"/>
+            </a:schemeClr>
+          </a:lnRef>
+          <a:fillRef idx="1">
+            <a:schemeClr val="accent1"/>
+          </a:fillRef>
+          <a:effectRef idx="0">
+            <a:schemeClr val="accent1"/>
+          </a:effectRef>
+          <a:fontRef idx="minor">
+            <a:schemeClr val="lt1"/>
+          </a:fontRef>
+        </p:style>
+        <p:txBody>
+          <a:bodyPr rtlCol="0" anchor="ctr"/>
+          <a:lstStyle/>
+          <a:p>
+            <a:pPr algn="ctr"/>
+            <a:endParaRPr lang="de-DE" noProof="0" dirty="0"/>
+          </a:p>
+        </p:txBody>
+      </p:sp>
+      <p:sp>
+        <p:nvSpPr>
+          <p:cNvPr id="4" name="Titel 3">
+            <a:extLst>
+              <a:ext uri="{FF2B5EF4-FFF2-40B4-BE49-F238E27FC236}">
+                <a16:creationId xmlns:a16="http://schemas.microsoft.com/office/drawing/2014/main" id="{C074B802-E0BA-FC78-63EB-18DDA090146A}"/>
+              </a:ext>
+            </a:extLst>
+          </p:cNvPr>
+          <p:cNvSpPr>
+            <a:spLocks noGrp="1"/>
+          </p:cNvSpPr>
+          <p:nvPr>
+            <p:ph type="ctrTitle"/>
+          </p:nvPr>
+        </p:nvSpPr>
+        <p:spPr/>
+        <p:txBody>
+          <a:bodyPr/>
+          <a:lstStyle/>
+          <a:p>
+            <a:r>
+              <a:rPr lang="de-DE" b="1" dirty="0"/>
+              <a:t>Preview</a:t>
+            </a:r>
+            <a:endParaRPr lang="de-DE" b="1" noProof="0" dirty="0"/>
+          </a:p>
+        </p:txBody>
+      </p:sp>
+      <p:grpSp>
+        <p:nvGrpSpPr>
+          <p:cNvPr id="10" name="Gruppieren 9">
+            <a:extLst>
+              <a:ext uri="{FF2B5EF4-FFF2-40B4-BE49-F238E27FC236}">
+                <a16:creationId xmlns:a16="http://schemas.microsoft.com/office/drawing/2014/main" id="{43D7A97A-A4A9-224B-B8B2-6FB6DAF7E6BC}"/>
+              </a:ext>
+            </a:extLst>
+          </p:cNvPr>
+          <p:cNvGrpSpPr/>
+          <p:nvPr/>
+        </p:nvGrpSpPr>
+        <p:grpSpPr>
+          <a:xfrm rot="10800000">
+            <a:off x="9787820" y="171039"/>
+            <a:ext cx="2292347" cy="6577487"/>
+            <a:chOff x="9738433" y="171039"/>
+            <a:chExt cx="2292347" cy="6577487"/>
+          </a:xfrm>
+        </p:grpSpPr>
+        <p:sp>
+          <p:nvSpPr>
+            <p:cNvPr id="8" name="Rectangle 1">
+              <a:extLst>
+                <a:ext uri="{FF2B5EF4-FFF2-40B4-BE49-F238E27FC236}">
+                  <a16:creationId xmlns:a16="http://schemas.microsoft.com/office/drawing/2014/main" id="{1C429401-3FA3-2306-E0CD-3176AAEC0452}"/>
+                </a:ext>
+              </a:extLst>
+            </p:cNvPr>
+            <p:cNvSpPr/>
+            <p:nvPr/>
+          </p:nvSpPr>
+          <p:spPr>
+            <a:xfrm>
+              <a:off x="9738433" y="171039"/>
+              <a:ext cx="266697" cy="6479732"/>
+            </a:xfrm>
+            <a:prstGeom prst="rect">
+              <a:avLst/>
+            </a:prstGeom>
+            <a:ln>
+              <a:noFill/>
+            </a:ln>
+          </p:spPr>
+          <p:style>
+            <a:lnRef idx="2">
+              <a:schemeClr val="accent1">
+                <a:shade val="15000"/>
+              </a:schemeClr>
+            </a:lnRef>
+            <a:fillRef idx="1">
+              <a:schemeClr val="accent1"/>
+            </a:fillRef>
+            <a:effectRef idx="0">
+              <a:schemeClr val="accent1"/>
+            </a:effectRef>
+            <a:fontRef idx="minor">
+              <a:schemeClr val="lt1"/>
+            </a:fontRef>
+          </p:style>
+          <p:txBody>
+            <a:bodyPr rtlCol="0" anchor="ctr"/>
+            <a:lstStyle/>
+            <a:p>
+              <a:pPr algn="ctr"/>
+              <a:endParaRPr lang="de-DE" noProof="0" dirty="0"/>
+            </a:p>
+          </p:txBody>
+        </p:sp>
+        <p:sp>
+          <p:nvSpPr>
+            <p:cNvPr id="9" name="Rectangle 2">
+              <a:extLst>
+                <a:ext uri="{FF2B5EF4-FFF2-40B4-BE49-F238E27FC236}">
+                  <a16:creationId xmlns:a16="http://schemas.microsoft.com/office/drawing/2014/main" id="{B15684CF-408B-FC3F-99AD-476BBFBE27AF}"/>
+                </a:ext>
+              </a:extLst>
+            </p:cNvPr>
+            <p:cNvSpPr/>
+            <p:nvPr/>
+          </p:nvSpPr>
+          <p:spPr>
+            <a:xfrm>
+              <a:off x="9738433" y="6447755"/>
+              <a:ext cx="2292347" cy="300771"/>
+            </a:xfrm>
+            <a:prstGeom prst="rect">
+              <a:avLst/>
+            </a:prstGeom>
+            <a:ln>
+              <a:noFill/>
+            </a:ln>
+          </p:spPr>
+          <p:style>
+            <a:lnRef idx="2">
+              <a:schemeClr val="accent1">
+                <a:shade val="15000"/>
+              </a:schemeClr>
+            </a:lnRef>
+            <a:fillRef idx="1">
+              <a:schemeClr val="accent1"/>
+            </a:fillRef>
+            <a:effectRef idx="0">
+              <a:schemeClr val="accent1"/>
+            </a:effectRef>
+            <a:fontRef idx="minor">
+              <a:schemeClr val="lt1"/>
+            </a:fontRef>
+          </p:style>
+          <p:txBody>
+            <a:bodyPr rtlCol="0" anchor="ctr"/>
+            <a:lstStyle/>
+            <a:p>
+              <a:pPr algn="ctr"/>
+              <a:endParaRPr lang="de-DE" noProof="0" dirty="0"/>
+            </a:p>
+          </p:txBody>
+        </p:sp>
+      </p:grpSp>
+      <p:sp>
+        <p:nvSpPr>
+          <p:cNvPr id="5" name="Foliennummernplatzhalter 4">
+            <a:extLst>
+              <a:ext uri="{FF2B5EF4-FFF2-40B4-BE49-F238E27FC236}">
+                <a16:creationId xmlns:a16="http://schemas.microsoft.com/office/drawing/2014/main" id="{B3B15F49-3892-8505-CD97-FADDF2156DCA}"/>
+              </a:ext>
+            </a:extLst>
+          </p:cNvPr>
+          <p:cNvSpPr>
+            <a:spLocks noGrp="1"/>
+          </p:cNvSpPr>
+          <p:nvPr>
+            <p:ph type="sldNum" sz="quarter" idx="12"/>
+          </p:nvPr>
+        </p:nvSpPr>
+        <p:spPr/>
+        <p:txBody>
+          <a:bodyPr/>
+          <a:lstStyle/>
+          <a:p>
+            <a:fld id="{0AB081A1-1B31-4B03-A7DA-E9A52B55500E}" type="slidenum">
+              <a:rPr lang="de-DE" sz="1800" b="1" noProof="0" smtClean="0"/>
+              <a:t>19</a:t>
+            </a:fld>
+            <a:endParaRPr lang="de-DE" sz="1800" b="1" noProof="0" dirty="0"/>
+          </a:p>
+        </p:txBody>
+      </p:sp>
+    </p:spTree>
+    <p:extLst>
+      <p:ext uri="{BB962C8B-B14F-4D97-AF65-F5344CB8AC3E}">
+        <p14:creationId xmlns:p14="http://schemas.microsoft.com/office/powerpoint/2010/main" val="3960406340"/>
+      </p:ext>
+    </p:extLst>
+  </p:cSld>
+  <p:clrMapOvr>
+    <a:masterClrMapping/>
+  </p:clrMapOvr>
+</p:sld>
+</file>
+
+<file path=ppt/slides/slide2.xml><?xml version="1.0" encoding="utf-8"?>
+<p:sld xmlns:a="http://schemas.openxmlformats.org/drawingml/2006/main" xmlns:r="http://schemas.openxmlformats.org/officeDocument/2006/relationships" xmlns:p="http://schemas.openxmlformats.org/presentationml/2006/main">
+  <p:cSld>
+    <p:spTree>
+      <p:nvGrpSpPr>
+        <p:cNvPr id="1" name="">
+          <a:extLst>
+            <a:ext uri="{FF2B5EF4-FFF2-40B4-BE49-F238E27FC236}">
+              <a16:creationId xmlns:a16="http://schemas.microsoft.com/office/drawing/2014/main" id="{7FFB18E0-896F-9472-E42D-1120B56BE792}"/>
+            </a:ext>
+          </a:extLst>
+        </p:cNvPr>
+        <p:cNvGrpSpPr/>
+        <p:nvPr/>
+      </p:nvGrpSpPr>
+      <p:grpSpPr>
+        <a:xfrm>
+          <a:off x="0" y="0"/>
+          <a:ext cx="0" cy="0"/>
+          <a:chOff x="0" y="0"/>
+          <a:chExt cx="0" cy="0"/>
+        </a:xfrm>
+      </p:grpSpPr>
+      <p:sp>
+        <p:nvSpPr>
+          <p:cNvPr id="2" name="Rectangle 1">
+            <a:extLst>
+              <a:ext uri="{FF2B5EF4-FFF2-40B4-BE49-F238E27FC236}">
+                <a16:creationId xmlns:a16="http://schemas.microsoft.com/office/drawing/2014/main" id="{2D40B634-9F89-E79F-F6E1-7F062E3C60A4}"/>
+              </a:ext>
+            </a:extLst>
+          </p:cNvPr>
+          <p:cNvSpPr/>
+          <p:nvPr/>
+        </p:nvSpPr>
+        <p:spPr>
+          <a:xfrm>
+            <a:off x="111833" y="171039"/>
+            <a:ext cx="266697" cy="6479732"/>
+          </a:xfrm>
+          <a:prstGeom prst="rect">
+            <a:avLst/>
+          </a:prstGeom>
+          <a:ln>
+            <a:noFill/>
+          </a:ln>
+        </p:spPr>
+        <p:style>
+          <a:lnRef idx="2">
+            <a:schemeClr val="accent1">
+              <a:shade val="15000"/>
+            </a:schemeClr>
+          </a:lnRef>
+          <a:fillRef idx="1">
+            <a:schemeClr val="accent1"/>
+          </a:fillRef>
+          <a:effectRef idx="0">
+            <a:schemeClr val="accent1"/>
+          </a:effectRef>
+          <a:fontRef idx="minor">
+            <a:schemeClr val="lt1"/>
+          </a:fontRef>
+        </p:style>
+        <p:txBody>
+          <a:bodyPr rtlCol="0" anchor="ctr"/>
+          <a:lstStyle/>
+          <a:p>
+            <a:pPr algn="ctr"/>
+            <a:endParaRPr lang="de-DE" noProof="0" dirty="0"/>
+          </a:p>
+        </p:txBody>
+      </p:sp>
+      <p:sp>
+        <p:nvSpPr>
+          <p:cNvPr id="3" name="Rectangle 2">
+            <a:extLst>
+              <a:ext uri="{FF2B5EF4-FFF2-40B4-BE49-F238E27FC236}">
+                <a16:creationId xmlns:a16="http://schemas.microsoft.com/office/drawing/2014/main" id="{FECE32A8-C401-9A65-FF67-5C1C853D0643}"/>
+              </a:ext>
+            </a:extLst>
+          </p:cNvPr>
+          <p:cNvSpPr/>
+          <p:nvPr/>
+        </p:nvSpPr>
+        <p:spPr>
+          <a:xfrm>
+            <a:off x="111833" y="6447755"/>
+            <a:ext cx="2292347" cy="300771"/>
+          </a:xfrm>
+          <a:prstGeom prst="rect">
+            <a:avLst/>
+          </a:prstGeom>
+          <a:ln>
+            <a:noFill/>
+          </a:ln>
+        </p:spPr>
+        <p:style>
+          <a:lnRef idx="2">
+            <a:schemeClr val="accent1">
+              <a:shade val="15000"/>
+            </a:schemeClr>
+          </a:lnRef>
+          <a:fillRef idx="1">
+            <a:schemeClr val="accent1"/>
+          </a:fillRef>
+          <a:effectRef idx="0">
+            <a:schemeClr val="accent1"/>
+          </a:effectRef>
+          <a:fontRef idx="minor">
+            <a:schemeClr val="lt1"/>
+          </a:fontRef>
+        </p:style>
+        <p:txBody>
+          <a:bodyPr rtlCol="0" anchor="ctr"/>
+          <a:lstStyle/>
+          <a:p>
+            <a:pPr algn="ctr"/>
+            <a:endParaRPr lang="de-DE" noProof="0" dirty="0"/>
+          </a:p>
+        </p:txBody>
+      </p:sp>
+      <p:sp>
+        <p:nvSpPr>
+          <p:cNvPr id="4" name="Titel 3">
+            <a:extLst>
+              <a:ext uri="{FF2B5EF4-FFF2-40B4-BE49-F238E27FC236}">
+                <a16:creationId xmlns:a16="http://schemas.microsoft.com/office/drawing/2014/main" id="{F919FCE7-CD6A-EEA6-EB3C-2499DBE31C54}"/>
+              </a:ext>
+            </a:extLst>
+          </p:cNvPr>
+          <p:cNvSpPr>
+            <a:spLocks noGrp="1"/>
+          </p:cNvSpPr>
+          <p:nvPr>
+            <p:ph type="ctrTitle"/>
+          </p:nvPr>
+        </p:nvSpPr>
+        <p:spPr/>
+        <p:txBody>
+          <a:bodyPr/>
+          <a:lstStyle/>
+          <a:p>
+            <a:r>
+              <a:rPr lang="de-DE" b="1" noProof="0" dirty="0"/>
+              <a:t>Workflows</a:t>
+            </a:r>
+          </a:p>
+        </p:txBody>
+      </p:sp>
+      <p:grpSp>
+        <p:nvGrpSpPr>
+          <p:cNvPr id="10" name="Gruppieren 9">
+            <a:extLst>
+              <a:ext uri="{FF2B5EF4-FFF2-40B4-BE49-F238E27FC236}">
+                <a16:creationId xmlns:a16="http://schemas.microsoft.com/office/drawing/2014/main" id="{AD0F9347-AEE0-F73F-E02F-1371ABB5C4E1}"/>
+              </a:ext>
+            </a:extLst>
+          </p:cNvPr>
+          <p:cNvGrpSpPr/>
+          <p:nvPr/>
+        </p:nvGrpSpPr>
+        <p:grpSpPr>
+          <a:xfrm rot="10800000">
+            <a:off x="9787820" y="171039"/>
+            <a:ext cx="2292347" cy="6577487"/>
+            <a:chOff x="9738433" y="171039"/>
+            <a:chExt cx="2292347" cy="6577487"/>
+          </a:xfrm>
+        </p:grpSpPr>
+        <p:sp>
+          <p:nvSpPr>
+            <p:cNvPr id="8" name="Rectangle 1">
+              <a:extLst>
+                <a:ext uri="{FF2B5EF4-FFF2-40B4-BE49-F238E27FC236}">
+                  <a16:creationId xmlns:a16="http://schemas.microsoft.com/office/drawing/2014/main" id="{120EFAEC-5083-CED9-400D-A5A126B2EFE0}"/>
+                </a:ext>
+              </a:extLst>
+            </p:cNvPr>
+            <p:cNvSpPr/>
+            <p:nvPr/>
+          </p:nvSpPr>
+          <p:spPr>
+            <a:xfrm>
+              <a:off x="9738433" y="171039"/>
+              <a:ext cx="266697" cy="6479732"/>
+            </a:xfrm>
+            <a:prstGeom prst="rect">
+              <a:avLst/>
+            </a:prstGeom>
+            <a:ln>
+              <a:noFill/>
+            </a:ln>
+          </p:spPr>
+          <p:style>
+            <a:lnRef idx="2">
+              <a:schemeClr val="accent1">
+                <a:shade val="15000"/>
+              </a:schemeClr>
+            </a:lnRef>
+            <a:fillRef idx="1">
+              <a:schemeClr val="accent1"/>
+            </a:fillRef>
+            <a:effectRef idx="0">
+              <a:schemeClr val="accent1"/>
+            </a:effectRef>
+            <a:fontRef idx="minor">
+              <a:schemeClr val="lt1"/>
+            </a:fontRef>
+          </p:style>
+          <p:txBody>
+            <a:bodyPr rtlCol="0" anchor="ctr"/>
+            <a:lstStyle/>
+            <a:p>
+              <a:pPr algn="ctr"/>
+              <a:endParaRPr lang="de-DE" noProof="0" dirty="0"/>
+            </a:p>
+          </p:txBody>
+        </p:sp>
+        <p:sp>
+          <p:nvSpPr>
+            <p:cNvPr id="9" name="Rectangle 2">
+              <a:extLst>
+                <a:ext uri="{FF2B5EF4-FFF2-40B4-BE49-F238E27FC236}">
+                  <a16:creationId xmlns:a16="http://schemas.microsoft.com/office/drawing/2014/main" id="{F320EC1B-A2E2-5E81-3678-1F755671021A}"/>
+                </a:ext>
+              </a:extLst>
+            </p:cNvPr>
+            <p:cNvSpPr/>
+            <p:nvPr/>
+          </p:nvSpPr>
+          <p:spPr>
+            <a:xfrm>
+              <a:off x="9738433" y="6447755"/>
+              <a:ext cx="2292347" cy="300771"/>
+            </a:xfrm>
+            <a:prstGeom prst="rect">
+              <a:avLst/>
+            </a:prstGeom>
+            <a:ln>
+              <a:noFill/>
+            </a:ln>
+          </p:spPr>
+          <p:style>
+            <a:lnRef idx="2">
+              <a:schemeClr val="accent1">
+                <a:shade val="15000"/>
+              </a:schemeClr>
+            </a:lnRef>
+            <a:fillRef idx="1">
+              <a:schemeClr val="accent1"/>
+            </a:fillRef>
+            <a:effectRef idx="0">
+              <a:schemeClr val="accent1"/>
+            </a:effectRef>
+            <a:fontRef idx="minor">
+              <a:schemeClr val="lt1"/>
+            </a:fontRef>
+          </p:style>
+          <p:txBody>
+            <a:bodyPr rtlCol="0" anchor="ctr"/>
+            <a:lstStyle/>
+            <a:p>
+              <a:pPr algn="ctr"/>
+              <a:endParaRPr lang="de-DE" noProof="0" dirty="0"/>
+            </a:p>
+          </p:txBody>
+        </p:sp>
+      </p:grpSp>
+      <p:sp>
+        <p:nvSpPr>
+          <p:cNvPr id="5" name="Foliennummernplatzhalter 4">
+            <a:extLst>
+              <a:ext uri="{FF2B5EF4-FFF2-40B4-BE49-F238E27FC236}">
+                <a16:creationId xmlns:a16="http://schemas.microsoft.com/office/drawing/2014/main" id="{E780EFBD-5D2E-4FF4-36EC-5B53C797BAED}"/>
+              </a:ext>
+            </a:extLst>
+          </p:cNvPr>
+          <p:cNvSpPr>
+            <a:spLocks noGrp="1"/>
+          </p:cNvSpPr>
+          <p:nvPr>
+            <p:ph type="sldNum" sz="quarter" idx="12"/>
+          </p:nvPr>
+        </p:nvSpPr>
+        <p:spPr/>
+        <p:txBody>
+          <a:bodyPr/>
+          <a:lstStyle/>
+          <a:p>
+            <a:fld id="{0AB081A1-1B31-4B03-A7DA-E9A52B55500E}" type="slidenum">
+              <a:rPr lang="de-DE" sz="1800" b="1" noProof="0" smtClean="0"/>
+              <a:t>2</a:t>
+            </a:fld>
+            <a:endParaRPr lang="de-DE" sz="1800" b="1" noProof="0" dirty="0"/>
+          </a:p>
+        </p:txBody>
+      </p:sp>
+    </p:spTree>
+    <p:extLst>
+      <p:ext uri="{BB962C8B-B14F-4D97-AF65-F5344CB8AC3E}">
+        <p14:creationId xmlns:p14="http://schemas.microsoft.com/office/powerpoint/2010/main" val="3610997094"/>
+      </p:ext>
+    </p:extLst>
+  </p:cSld>
+  <p:clrMapOvr>
+    <a:masterClrMapping/>
+  </p:clrMapOvr>
+</p:sld>
+</file>
+
+<file path=ppt/slides/slide20.xml><?xml version="1.0" encoding="utf-8"?>
+<p:sld xmlns:a="http://schemas.openxmlformats.org/drawingml/2006/main" xmlns:r="http://schemas.openxmlformats.org/officeDocument/2006/relationships" xmlns:p="http://schemas.openxmlformats.org/presentationml/2006/main">
+  <p:cSld>
+    <p:spTree>
+      <p:nvGrpSpPr>
+        <p:cNvPr id="1" name="">
+          <a:extLst>
+            <a:ext uri="{FF2B5EF4-FFF2-40B4-BE49-F238E27FC236}">
+              <a16:creationId xmlns:a16="http://schemas.microsoft.com/office/drawing/2014/main" id="{D93F4A44-71F2-EE79-6E12-7B98C58B13C3}"/>
+            </a:ext>
+          </a:extLst>
+        </p:cNvPr>
+        <p:cNvGrpSpPr/>
+        <p:nvPr/>
+      </p:nvGrpSpPr>
+      <p:grpSpPr>
+        <a:xfrm>
+          <a:off x="0" y="0"/>
+          <a:ext cx="0" cy="0"/>
+          <a:chOff x="0" y="0"/>
+          <a:chExt cx="0" cy="0"/>
+        </a:xfrm>
+      </p:grpSpPr>
+      <p:sp>
+        <p:nvSpPr>
+          <p:cNvPr id="2" name="Rectangle 1">
+            <a:extLst>
+              <a:ext uri="{FF2B5EF4-FFF2-40B4-BE49-F238E27FC236}">
+                <a16:creationId xmlns:a16="http://schemas.microsoft.com/office/drawing/2014/main" id="{57D5298C-9275-94D9-D080-4CE8114E4A4F}"/>
+              </a:ext>
+            </a:extLst>
+          </p:cNvPr>
+          <p:cNvSpPr/>
+          <p:nvPr/>
+        </p:nvSpPr>
+        <p:spPr>
+          <a:xfrm>
+            <a:off x="111833" y="171039"/>
+            <a:ext cx="266697" cy="6479732"/>
+          </a:xfrm>
+          <a:prstGeom prst="rect">
+            <a:avLst/>
+          </a:prstGeom>
+          <a:ln>
+            <a:noFill/>
+          </a:ln>
+        </p:spPr>
+        <p:style>
+          <a:lnRef idx="2">
+            <a:schemeClr val="accent1">
+              <a:shade val="15000"/>
+            </a:schemeClr>
+          </a:lnRef>
+          <a:fillRef idx="1">
+            <a:schemeClr val="accent1"/>
+          </a:fillRef>
+          <a:effectRef idx="0">
+            <a:schemeClr val="accent1"/>
+          </a:effectRef>
+          <a:fontRef idx="minor">
+            <a:schemeClr val="lt1"/>
+          </a:fontRef>
+        </p:style>
+        <p:txBody>
+          <a:bodyPr rtlCol="0" anchor="ctr"/>
+          <a:lstStyle/>
+          <a:p>
+            <a:pPr algn="ctr"/>
+            <a:endParaRPr lang="de-DE" noProof="0" dirty="0"/>
+          </a:p>
+        </p:txBody>
+      </p:sp>
+      <p:sp>
+        <p:nvSpPr>
+          <p:cNvPr id="3" name="Rectangle 2">
+            <a:extLst>
+              <a:ext uri="{FF2B5EF4-FFF2-40B4-BE49-F238E27FC236}">
+                <a16:creationId xmlns:a16="http://schemas.microsoft.com/office/drawing/2014/main" id="{EB0589AF-CBEA-E0A8-24F4-921CA0EEABB7}"/>
+              </a:ext>
+            </a:extLst>
+          </p:cNvPr>
+          <p:cNvSpPr/>
+          <p:nvPr/>
+        </p:nvSpPr>
+        <p:spPr>
+          <a:xfrm>
+            <a:off x="111833" y="6447755"/>
+            <a:ext cx="2292347" cy="300771"/>
+          </a:xfrm>
+          <a:prstGeom prst="rect">
+            <a:avLst/>
+          </a:prstGeom>
+          <a:ln>
+            <a:noFill/>
+          </a:ln>
+        </p:spPr>
+        <p:style>
+          <a:lnRef idx="2">
+            <a:schemeClr val="accent1">
+              <a:shade val="15000"/>
+            </a:schemeClr>
+          </a:lnRef>
+          <a:fillRef idx="1">
+            <a:schemeClr val="accent1"/>
+          </a:fillRef>
+          <a:effectRef idx="0">
+            <a:schemeClr val="accent1"/>
+          </a:effectRef>
+          <a:fontRef idx="minor">
+            <a:schemeClr val="lt1"/>
+          </a:fontRef>
+        </p:style>
+        <p:txBody>
+          <a:bodyPr rtlCol="0" anchor="ctr"/>
+          <a:lstStyle/>
+          <a:p>
+            <a:pPr algn="ctr"/>
+            <a:endParaRPr lang="de-DE" noProof="0" dirty="0"/>
+          </a:p>
+        </p:txBody>
+      </p:sp>
+      <p:sp>
+        <p:nvSpPr>
+          <p:cNvPr id="9" name="Textfeld 8">
+            <a:extLst>
+              <a:ext uri="{FF2B5EF4-FFF2-40B4-BE49-F238E27FC236}">
+                <a16:creationId xmlns:a16="http://schemas.microsoft.com/office/drawing/2014/main" id="{A05902C7-B39A-B1C9-FEB0-1C1F5783B17F}"/>
+              </a:ext>
+            </a:extLst>
+          </p:cNvPr>
+          <p:cNvSpPr txBox="1"/>
+          <p:nvPr/>
+        </p:nvSpPr>
+        <p:spPr>
+          <a:xfrm>
+            <a:off x="378530" y="539728"/>
+            <a:ext cx="5668878" cy="727683"/>
+          </a:xfrm>
+          <a:prstGeom prst="rect">
+            <a:avLst/>
+          </a:prstGeom>
+          <a:noFill/>
+        </p:spPr>
+        <p:txBody>
+          <a:bodyPr wrap="square" rtlCol="0">
+            <a:spAutoFit/>
+          </a:bodyPr>
+          <a:lstStyle/>
+          <a:p>
+            <a:r>
+              <a:rPr lang="de-DE" sz="4000" b="1" u="sng" noProof="0" dirty="0"/>
+              <a:t>Preview</a:t>
+            </a:r>
+            <a:endParaRPr lang="de-DE" sz="4000" u="sng" noProof="0" dirty="0"/>
+          </a:p>
+        </p:txBody>
+      </p:sp>
+      <p:sp>
+        <p:nvSpPr>
+          <p:cNvPr id="4" name="Foliennummernplatzhalter 3">
+            <a:extLst>
+              <a:ext uri="{FF2B5EF4-FFF2-40B4-BE49-F238E27FC236}">
+                <a16:creationId xmlns:a16="http://schemas.microsoft.com/office/drawing/2014/main" id="{AFB5B727-2C98-397C-5748-C67E646A5917}"/>
+              </a:ext>
+            </a:extLst>
+          </p:cNvPr>
+          <p:cNvSpPr>
+            <a:spLocks noGrp="1"/>
+          </p:cNvSpPr>
+          <p:nvPr>
+            <p:ph type="sldNum" sz="quarter" idx="12"/>
+          </p:nvPr>
+        </p:nvSpPr>
+        <p:spPr/>
+        <p:txBody>
+          <a:bodyPr/>
+          <a:lstStyle/>
+          <a:p>
+            <a:fld id="{0AB081A1-1B31-4B03-A7DA-E9A52B55500E}" type="slidenum">
+              <a:rPr lang="de-DE" sz="1800" b="1" noProof="0" smtClean="0"/>
+              <a:t>20</a:t>
+            </a:fld>
+            <a:endParaRPr lang="de-DE" sz="1800" b="1" noProof="0" dirty="0"/>
+          </a:p>
+        </p:txBody>
+      </p:sp>
+      <p:pic>
+        <p:nvPicPr>
+          <p:cNvPr id="8" name="Grafik 7">
+            <a:extLst>
+              <a:ext uri="{FF2B5EF4-FFF2-40B4-BE49-F238E27FC236}">
+                <a16:creationId xmlns:a16="http://schemas.microsoft.com/office/drawing/2014/main" id="{70972E9A-4A11-DC2B-6FEE-6BD2E7837D78}"/>
+              </a:ext>
+            </a:extLst>
+          </p:cNvPr>
+          <p:cNvPicPr>
+            <a:picLocks noChangeAspect="1"/>
+          </p:cNvPicPr>
+          <p:nvPr/>
+        </p:nvPicPr>
+        <p:blipFill>
+          <a:blip r:embed="rId2"/>
+          <a:stretch>
+            <a:fillRect/>
+          </a:stretch>
+        </p:blipFill>
+        <p:spPr>
+          <a:xfrm>
+            <a:off x="675297" y="1306466"/>
+            <a:ext cx="4277322" cy="1105054"/>
+          </a:xfrm>
+          <a:prstGeom prst="rect">
+            <a:avLst/>
+          </a:prstGeom>
+        </p:spPr>
+      </p:pic>
+      <p:pic>
+        <p:nvPicPr>
+          <p:cNvPr id="11" name="Grafik 10">
+            <a:extLst>
+              <a:ext uri="{FF2B5EF4-FFF2-40B4-BE49-F238E27FC236}">
+                <a16:creationId xmlns:a16="http://schemas.microsoft.com/office/drawing/2014/main" id="{562E49A9-AF22-8ACA-C5D8-1731A6B8FBDD}"/>
+              </a:ext>
+            </a:extLst>
+          </p:cNvPr>
+          <p:cNvPicPr>
+            <a:picLocks noChangeAspect="1"/>
+          </p:cNvPicPr>
+          <p:nvPr/>
+        </p:nvPicPr>
+        <p:blipFill>
+          <a:blip r:embed="rId3"/>
+          <a:stretch>
+            <a:fillRect/>
+          </a:stretch>
+        </p:blipFill>
+        <p:spPr>
+          <a:xfrm>
+            <a:off x="675298" y="3458533"/>
+            <a:ext cx="6215360" cy="2240330"/>
+          </a:xfrm>
+          <a:prstGeom prst="rect">
+            <a:avLst/>
+          </a:prstGeom>
+        </p:spPr>
+      </p:pic>
+      <p:sp>
+        <p:nvSpPr>
+          <p:cNvPr id="6" name="Textfeld 5">
+            <a:extLst>
+              <a:ext uri="{FF2B5EF4-FFF2-40B4-BE49-F238E27FC236}">
+                <a16:creationId xmlns:a16="http://schemas.microsoft.com/office/drawing/2014/main" id="{CEAA6E81-9054-F5A6-6126-C8B8B5EAF326}"/>
+              </a:ext>
+            </a:extLst>
+          </p:cNvPr>
+          <p:cNvSpPr txBox="1"/>
+          <p:nvPr/>
+        </p:nvSpPr>
+        <p:spPr>
+          <a:xfrm>
+            <a:off x="7187426" y="4343400"/>
+            <a:ext cx="4689554" cy="369332"/>
+          </a:xfrm>
+          <a:prstGeom prst="rect">
+            <a:avLst/>
+          </a:prstGeom>
+          <a:noFill/>
+        </p:spPr>
+        <p:txBody>
+          <a:bodyPr wrap="none" rtlCol="0">
+            <a:spAutoFit/>
+          </a:bodyPr>
+          <a:lstStyle/>
+          <a:p>
+            <a:pPr marL="285750" indent="-285750">
+              <a:buFont typeface="Arial" panose="020B0604020202020204" pitchFamily="34" charset="0"/>
+              <a:buChar char="•"/>
+            </a:pPr>
+            <a:r>
+              <a:rPr lang="de-DE" dirty="0"/>
+              <a:t>Mittels cast nach </a:t>
+            </a:r>
+            <a:r>
+              <a:rPr lang="de-DE" dirty="0" err="1"/>
+              <a:t>Component</a:t>
+            </a:r>
+            <a:r>
+              <a:rPr lang="de-DE" dirty="0"/>
+              <a:t> typ abfragen</a:t>
+            </a:r>
+          </a:p>
+        </p:txBody>
+      </p:sp>
+      <p:sp>
+        <p:nvSpPr>
+          <p:cNvPr id="7" name="Textfeld 6">
+            <a:extLst>
+              <a:ext uri="{FF2B5EF4-FFF2-40B4-BE49-F238E27FC236}">
+                <a16:creationId xmlns:a16="http://schemas.microsoft.com/office/drawing/2014/main" id="{5B770D01-47E5-1482-844D-1045B323CB9E}"/>
+              </a:ext>
+            </a:extLst>
+          </p:cNvPr>
+          <p:cNvSpPr txBox="1"/>
+          <p:nvPr/>
+        </p:nvSpPr>
+        <p:spPr>
+          <a:xfrm>
+            <a:off x="7187426" y="1674327"/>
+            <a:ext cx="4069256" cy="369332"/>
+          </a:xfrm>
+          <a:prstGeom prst="rect">
+            <a:avLst/>
+          </a:prstGeom>
+          <a:noFill/>
+        </p:spPr>
+        <p:txBody>
+          <a:bodyPr wrap="none" rtlCol="0">
+            <a:spAutoFit/>
+          </a:bodyPr>
+          <a:lstStyle/>
+          <a:p>
+            <a:pPr marL="285750" indent="-285750">
+              <a:buFont typeface="Arial" panose="020B0604020202020204" pitchFamily="34" charset="0"/>
+              <a:buChar char="•"/>
+            </a:pPr>
+            <a:r>
+              <a:rPr lang="de-DE" dirty="0" err="1"/>
+              <a:t>Componenten</a:t>
+            </a:r>
+            <a:r>
+              <a:rPr lang="de-DE" dirty="0"/>
+              <a:t> und </a:t>
+            </a:r>
+            <a:r>
+              <a:rPr lang="de-DE" dirty="0" err="1"/>
+              <a:t>Resourcen</a:t>
+            </a:r>
+            <a:r>
+              <a:rPr lang="de-DE" dirty="0"/>
+              <a:t> laden</a:t>
+            </a:r>
+          </a:p>
+        </p:txBody>
+      </p:sp>
+    </p:spTree>
+    <p:extLst>
+      <p:ext uri="{BB962C8B-B14F-4D97-AF65-F5344CB8AC3E}">
+        <p14:creationId xmlns:p14="http://schemas.microsoft.com/office/powerpoint/2010/main" val="2245282106"/>
+      </p:ext>
+    </p:extLst>
+  </p:cSld>
+  <p:clrMapOvr>
+    <a:masterClrMapping/>
+  </p:clrMapOvr>
+</p:sld>
+</file>
+
+<file path=ppt/slides/slide21.xml><?xml version="1.0" encoding="utf-8"?>
+<p:sld xmlns:a="http://schemas.openxmlformats.org/drawingml/2006/main" xmlns:r="http://schemas.openxmlformats.org/officeDocument/2006/relationships" xmlns:p="http://schemas.openxmlformats.org/presentationml/2006/main">
+  <p:cSld>
+    <p:spTree>
+      <p:nvGrpSpPr>
+        <p:cNvPr id="1" name="">
+          <a:extLst>
+            <a:ext uri="{FF2B5EF4-FFF2-40B4-BE49-F238E27FC236}">
+              <a16:creationId xmlns:a16="http://schemas.microsoft.com/office/drawing/2014/main" id="{FCEA7B2E-7306-6C5A-3149-003F71AF26A3}"/>
+            </a:ext>
+          </a:extLst>
+        </p:cNvPr>
+        <p:cNvGrpSpPr/>
+        <p:nvPr/>
+      </p:nvGrpSpPr>
+      <p:grpSpPr>
+        <a:xfrm>
+          <a:off x="0" y="0"/>
+          <a:ext cx="0" cy="0"/>
+          <a:chOff x="0" y="0"/>
+          <a:chExt cx="0" cy="0"/>
+        </a:xfrm>
+      </p:grpSpPr>
+      <p:sp>
+        <p:nvSpPr>
+          <p:cNvPr id="2" name="Rectangle 1">
+            <a:extLst>
+              <a:ext uri="{FF2B5EF4-FFF2-40B4-BE49-F238E27FC236}">
+                <a16:creationId xmlns:a16="http://schemas.microsoft.com/office/drawing/2014/main" id="{0FEA63FA-7925-03B1-4319-EF89F78607A0}"/>
+              </a:ext>
+            </a:extLst>
+          </p:cNvPr>
+          <p:cNvSpPr/>
+          <p:nvPr/>
+        </p:nvSpPr>
+        <p:spPr>
+          <a:xfrm>
+            <a:off x="111833" y="171039"/>
+            <a:ext cx="266697" cy="6479732"/>
+          </a:xfrm>
+          <a:prstGeom prst="rect">
+            <a:avLst/>
+          </a:prstGeom>
+          <a:ln>
+            <a:noFill/>
+          </a:ln>
+        </p:spPr>
+        <p:style>
+          <a:lnRef idx="2">
+            <a:schemeClr val="accent1">
+              <a:shade val="15000"/>
+            </a:schemeClr>
+          </a:lnRef>
+          <a:fillRef idx="1">
+            <a:schemeClr val="accent1"/>
+          </a:fillRef>
+          <a:effectRef idx="0">
+            <a:schemeClr val="accent1"/>
+          </a:effectRef>
+          <a:fontRef idx="minor">
+            <a:schemeClr val="lt1"/>
+          </a:fontRef>
+        </p:style>
+        <p:txBody>
+          <a:bodyPr rtlCol="0" anchor="ctr"/>
+          <a:lstStyle/>
+          <a:p>
+            <a:pPr algn="ctr"/>
+            <a:endParaRPr lang="de-DE" noProof="0" dirty="0"/>
+          </a:p>
+        </p:txBody>
+      </p:sp>
+      <p:sp>
+        <p:nvSpPr>
+          <p:cNvPr id="3" name="Rectangle 2">
+            <a:extLst>
+              <a:ext uri="{FF2B5EF4-FFF2-40B4-BE49-F238E27FC236}">
+                <a16:creationId xmlns:a16="http://schemas.microsoft.com/office/drawing/2014/main" id="{DBBF540F-2872-A40F-E688-5213212A6C82}"/>
+              </a:ext>
+            </a:extLst>
+          </p:cNvPr>
+          <p:cNvSpPr/>
+          <p:nvPr/>
+        </p:nvSpPr>
+        <p:spPr>
+          <a:xfrm>
+            <a:off x="111833" y="6447755"/>
+            <a:ext cx="2292347" cy="300771"/>
+          </a:xfrm>
+          <a:prstGeom prst="rect">
+            <a:avLst/>
+          </a:prstGeom>
+          <a:ln>
+            <a:noFill/>
+          </a:ln>
+        </p:spPr>
+        <p:style>
+          <a:lnRef idx="2">
+            <a:schemeClr val="accent1">
+              <a:shade val="15000"/>
+            </a:schemeClr>
+          </a:lnRef>
+          <a:fillRef idx="1">
+            <a:schemeClr val="accent1"/>
+          </a:fillRef>
+          <a:effectRef idx="0">
+            <a:schemeClr val="accent1"/>
+          </a:effectRef>
+          <a:fontRef idx="minor">
+            <a:schemeClr val="lt1"/>
+          </a:fontRef>
+        </p:style>
+        <p:txBody>
+          <a:bodyPr rtlCol="0" anchor="ctr"/>
+          <a:lstStyle/>
+          <a:p>
+            <a:pPr algn="ctr"/>
+            <a:endParaRPr lang="de-DE" noProof="0" dirty="0"/>
+          </a:p>
+        </p:txBody>
+      </p:sp>
+      <p:sp>
+        <p:nvSpPr>
+          <p:cNvPr id="9" name="Textfeld 8">
+            <a:extLst>
+              <a:ext uri="{FF2B5EF4-FFF2-40B4-BE49-F238E27FC236}">
+                <a16:creationId xmlns:a16="http://schemas.microsoft.com/office/drawing/2014/main" id="{100CC702-57EB-556D-5E2A-A2D4AADBF665}"/>
+              </a:ext>
+            </a:extLst>
+          </p:cNvPr>
+          <p:cNvSpPr txBox="1"/>
+          <p:nvPr/>
+        </p:nvSpPr>
+        <p:spPr>
+          <a:xfrm>
+            <a:off x="378530" y="539728"/>
+            <a:ext cx="5668878" cy="727683"/>
+          </a:xfrm>
+          <a:prstGeom prst="rect">
+            <a:avLst/>
+          </a:prstGeom>
+          <a:noFill/>
+        </p:spPr>
+        <p:txBody>
+          <a:bodyPr wrap="square" rtlCol="0">
+            <a:spAutoFit/>
+          </a:bodyPr>
+          <a:lstStyle/>
+          <a:p>
+            <a:r>
+              <a:rPr lang="de-DE" sz="4000" b="1" u="sng" noProof="0" dirty="0"/>
+              <a:t>Raytracing</a:t>
+            </a:r>
+            <a:endParaRPr lang="de-DE" sz="4000" u="sng" noProof="0" dirty="0"/>
+          </a:p>
+        </p:txBody>
+      </p:sp>
+      <p:sp>
+        <p:nvSpPr>
+          <p:cNvPr id="4" name="Foliennummernplatzhalter 3">
+            <a:extLst>
+              <a:ext uri="{FF2B5EF4-FFF2-40B4-BE49-F238E27FC236}">
+                <a16:creationId xmlns:a16="http://schemas.microsoft.com/office/drawing/2014/main" id="{53F6564E-D211-14C5-A4EF-75293370DE96}"/>
+              </a:ext>
+            </a:extLst>
+          </p:cNvPr>
+          <p:cNvSpPr>
+            <a:spLocks noGrp="1"/>
+          </p:cNvSpPr>
+          <p:nvPr>
+            <p:ph type="sldNum" sz="quarter" idx="12"/>
+          </p:nvPr>
+        </p:nvSpPr>
+        <p:spPr/>
+        <p:txBody>
+          <a:bodyPr/>
+          <a:lstStyle/>
+          <a:p>
+            <a:fld id="{0AB081A1-1B31-4B03-A7DA-E9A52B55500E}" type="slidenum">
+              <a:rPr lang="de-DE" sz="1800" b="1" noProof="0" smtClean="0"/>
+              <a:t>21</a:t>
+            </a:fld>
+            <a:endParaRPr lang="de-DE" sz="1800" b="1" noProof="0" dirty="0"/>
+          </a:p>
+        </p:txBody>
+      </p:sp>
+      <p:pic>
+        <p:nvPicPr>
+          <p:cNvPr id="5" name="Grafik 4">
+            <a:extLst>
+              <a:ext uri="{FF2B5EF4-FFF2-40B4-BE49-F238E27FC236}">
+                <a16:creationId xmlns:a16="http://schemas.microsoft.com/office/drawing/2014/main" id="{42C5DB46-3397-9470-294F-8A866796E8BA}"/>
+              </a:ext>
+            </a:extLst>
+          </p:cNvPr>
+          <p:cNvPicPr>
+            <a:picLocks noChangeAspect="1"/>
+          </p:cNvPicPr>
+          <p:nvPr/>
+        </p:nvPicPr>
+        <p:blipFill>
+          <a:blip r:embed="rId2"/>
+          <a:stretch>
+            <a:fillRect/>
+          </a:stretch>
+        </p:blipFill>
+        <p:spPr>
+          <a:xfrm>
+            <a:off x="770130" y="1794049"/>
+            <a:ext cx="7108406" cy="1069231"/>
+          </a:xfrm>
+          <a:prstGeom prst="rect">
+            <a:avLst/>
+          </a:prstGeom>
+        </p:spPr>
+      </p:pic>
+      <p:pic>
+        <p:nvPicPr>
+          <p:cNvPr id="10" name="Grafik 9">
+            <a:extLst>
+              <a:ext uri="{FF2B5EF4-FFF2-40B4-BE49-F238E27FC236}">
+                <a16:creationId xmlns:a16="http://schemas.microsoft.com/office/drawing/2014/main" id="{DE25500A-7933-2582-3771-6B598AD14F73}"/>
+              </a:ext>
+            </a:extLst>
+          </p:cNvPr>
+          <p:cNvPicPr>
+            <a:picLocks noChangeAspect="1"/>
+          </p:cNvPicPr>
+          <p:nvPr/>
+        </p:nvPicPr>
+        <p:blipFill>
+          <a:blip r:embed="rId3"/>
+          <a:stretch>
+            <a:fillRect/>
+          </a:stretch>
+        </p:blipFill>
+        <p:spPr>
+          <a:xfrm>
+            <a:off x="770130" y="3282077"/>
+            <a:ext cx="5185638" cy="2746880"/>
+          </a:xfrm>
+          <a:prstGeom prst="rect">
+            <a:avLst/>
+          </a:prstGeom>
+        </p:spPr>
+      </p:pic>
+      <p:pic>
+        <p:nvPicPr>
+          <p:cNvPr id="11" name="Grafik 10">
+            <a:extLst>
+              <a:ext uri="{FF2B5EF4-FFF2-40B4-BE49-F238E27FC236}">
+                <a16:creationId xmlns:a16="http://schemas.microsoft.com/office/drawing/2014/main" id="{E1FC43F4-512B-A146-6018-54F19C051F10}"/>
+              </a:ext>
+            </a:extLst>
+          </p:cNvPr>
+          <p:cNvPicPr>
+            <a:picLocks noChangeAspect="1"/>
+          </p:cNvPicPr>
+          <p:nvPr/>
+        </p:nvPicPr>
+        <p:blipFill>
+          <a:blip r:embed="rId4"/>
+          <a:stretch>
+            <a:fillRect/>
+          </a:stretch>
+        </p:blipFill>
+        <p:spPr>
+          <a:xfrm>
+            <a:off x="6945425" y="3792049"/>
+            <a:ext cx="1519297" cy="1307043"/>
+          </a:xfrm>
+          <a:prstGeom prst="rect">
+            <a:avLst/>
+          </a:prstGeom>
+        </p:spPr>
+      </p:pic>
+      <p:pic>
+        <p:nvPicPr>
+          <p:cNvPr id="13" name="Grafik 12">
+            <a:extLst>
+              <a:ext uri="{FF2B5EF4-FFF2-40B4-BE49-F238E27FC236}">
+                <a16:creationId xmlns:a16="http://schemas.microsoft.com/office/drawing/2014/main" id="{921934FE-032D-8B5C-A88C-9B7AF7CCC020}"/>
+              </a:ext>
+            </a:extLst>
+          </p:cNvPr>
+          <p:cNvPicPr>
+            <a:picLocks noChangeAspect="1"/>
+          </p:cNvPicPr>
+          <p:nvPr/>
+        </p:nvPicPr>
+        <p:blipFill>
+          <a:blip r:embed="rId5"/>
+          <a:stretch>
+            <a:fillRect/>
+          </a:stretch>
+        </p:blipFill>
+        <p:spPr>
+          <a:xfrm>
+            <a:off x="6047408" y="5334898"/>
+            <a:ext cx="3315332" cy="263629"/>
+          </a:xfrm>
+          <a:prstGeom prst="rect">
+            <a:avLst/>
+          </a:prstGeom>
+        </p:spPr>
+      </p:pic>
+      <p:pic>
+        <p:nvPicPr>
+          <p:cNvPr id="17" name="Grafik 16">
+            <a:extLst>
+              <a:ext uri="{FF2B5EF4-FFF2-40B4-BE49-F238E27FC236}">
+                <a16:creationId xmlns:a16="http://schemas.microsoft.com/office/drawing/2014/main" id="{C83689F4-A5D3-BC0F-B026-C1441D154061}"/>
+              </a:ext>
+            </a:extLst>
+          </p:cNvPr>
+          <p:cNvPicPr>
+            <a:picLocks noChangeAspect="1"/>
+          </p:cNvPicPr>
+          <p:nvPr/>
+        </p:nvPicPr>
+        <p:blipFill>
+          <a:blip r:embed="rId6"/>
+          <a:stretch>
+            <a:fillRect/>
+          </a:stretch>
+        </p:blipFill>
+        <p:spPr>
+          <a:xfrm>
+            <a:off x="9836234" y="3851933"/>
+            <a:ext cx="1820865" cy="1187273"/>
+          </a:xfrm>
+          <a:prstGeom prst="rect">
+            <a:avLst/>
+          </a:prstGeom>
+        </p:spPr>
+      </p:pic>
+      <p:pic>
+        <p:nvPicPr>
+          <p:cNvPr id="19" name="Grafik 18">
+            <a:extLst>
+              <a:ext uri="{FF2B5EF4-FFF2-40B4-BE49-F238E27FC236}">
+                <a16:creationId xmlns:a16="http://schemas.microsoft.com/office/drawing/2014/main" id="{1CF22AA5-7F77-8F9B-27F6-1D3E5FED814A}"/>
+              </a:ext>
+            </a:extLst>
+          </p:cNvPr>
+          <p:cNvPicPr>
+            <a:picLocks noChangeAspect="1"/>
+          </p:cNvPicPr>
+          <p:nvPr/>
+        </p:nvPicPr>
+        <p:blipFill>
+          <a:blip r:embed="rId7"/>
+          <a:stretch>
+            <a:fillRect/>
+          </a:stretch>
+        </p:blipFill>
+        <p:spPr>
+          <a:xfrm>
+            <a:off x="9375067" y="5276848"/>
+            <a:ext cx="2743200" cy="379727"/>
+          </a:xfrm>
+          <a:prstGeom prst="rect">
+            <a:avLst/>
+          </a:prstGeom>
+        </p:spPr>
+      </p:pic>
+    </p:spTree>
+    <p:extLst>
+      <p:ext uri="{BB962C8B-B14F-4D97-AF65-F5344CB8AC3E}">
+        <p14:creationId xmlns:p14="http://schemas.microsoft.com/office/powerpoint/2010/main" val="2540325736"/>
+      </p:ext>
+    </p:extLst>
+  </p:cSld>
+  <p:clrMapOvr>
+    <a:masterClrMapping/>
+  </p:clrMapOvr>
+</p:sld>
+</file>
+
+<file path=ppt/slides/slide22.xml><?xml version="1.0" encoding="utf-8"?>
+<p:sld xmlns:a="http://schemas.openxmlformats.org/drawingml/2006/main" xmlns:r="http://schemas.openxmlformats.org/officeDocument/2006/relationships" xmlns:p="http://schemas.openxmlformats.org/presentationml/2006/main">
+  <p:cSld>
+    <p:spTree>
+      <p:nvGrpSpPr>
+        <p:cNvPr id="1" name="">
+          <a:extLst>
+            <a:ext uri="{FF2B5EF4-FFF2-40B4-BE49-F238E27FC236}">
+              <a16:creationId xmlns:a16="http://schemas.microsoft.com/office/drawing/2014/main" id="{DC61C251-4651-5968-D4D4-E7D5B3072968}"/>
+            </a:ext>
+          </a:extLst>
+        </p:cNvPr>
+        <p:cNvGrpSpPr/>
+        <p:nvPr/>
+      </p:nvGrpSpPr>
+      <p:grpSpPr>
+        <a:xfrm>
+          <a:off x="0" y="0"/>
+          <a:ext cx="0" cy="0"/>
+          <a:chOff x="0" y="0"/>
+          <a:chExt cx="0" cy="0"/>
+        </a:xfrm>
+      </p:grpSpPr>
+      <p:sp>
+        <p:nvSpPr>
+          <p:cNvPr id="2" name="Rectangle 1">
+            <a:extLst>
+              <a:ext uri="{FF2B5EF4-FFF2-40B4-BE49-F238E27FC236}">
+                <a16:creationId xmlns:a16="http://schemas.microsoft.com/office/drawing/2014/main" id="{8DFD4AEB-A687-B332-52FF-F7A0A1FE6554}"/>
+              </a:ext>
+            </a:extLst>
+          </p:cNvPr>
+          <p:cNvSpPr/>
+          <p:nvPr/>
+        </p:nvSpPr>
+        <p:spPr>
+          <a:xfrm>
+            <a:off x="111833" y="171039"/>
+            <a:ext cx="266697" cy="6479732"/>
+          </a:xfrm>
+          <a:prstGeom prst="rect">
+            <a:avLst/>
+          </a:prstGeom>
+          <a:ln>
+            <a:noFill/>
+          </a:ln>
+        </p:spPr>
+        <p:style>
+          <a:lnRef idx="2">
+            <a:schemeClr val="accent1">
+              <a:shade val="15000"/>
+            </a:schemeClr>
+          </a:lnRef>
+          <a:fillRef idx="1">
+            <a:schemeClr val="accent1"/>
+          </a:fillRef>
+          <a:effectRef idx="0">
+            <a:schemeClr val="accent1"/>
+          </a:effectRef>
+          <a:fontRef idx="minor">
+            <a:schemeClr val="lt1"/>
+          </a:fontRef>
+        </p:style>
+        <p:txBody>
+          <a:bodyPr rtlCol="0" anchor="ctr"/>
+          <a:lstStyle/>
+          <a:p>
+            <a:pPr algn="ctr"/>
+            <a:endParaRPr lang="de-DE" noProof="0" dirty="0"/>
+          </a:p>
+        </p:txBody>
+      </p:sp>
+      <p:sp>
+        <p:nvSpPr>
+          <p:cNvPr id="3" name="Rectangle 2">
+            <a:extLst>
+              <a:ext uri="{FF2B5EF4-FFF2-40B4-BE49-F238E27FC236}">
+                <a16:creationId xmlns:a16="http://schemas.microsoft.com/office/drawing/2014/main" id="{FD7D28E2-01C0-3078-2E36-3AB5957B789C}"/>
+              </a:ext>
+            </a:extLst>
+          </p:cNvPr>
+          <p:cNvSpPr/>
+          <p:nvPr/>
+        </p:nvSpPr>
+        <p:spPr>
+          <a:xfrm>
+            <a:off x="111833" y="6447755"/>
+            <a:ext cx="2292347" cy="300771"/>
+          </a:xfrm>
+          <a:prstGeom prst="rect">
+            <a:avLst/>
+          </a:prstGeom>
+          <a:ln>
+            <a:noFill/>
+          </a:ln>
+        </p:spPr>
+        <p:style>
+          <a:lnRef idx="2">
+            <a:schemeClr val="accent1">
+              <a:shade val="15000"/>
+            </a:schemeClr>
+          </a:lnRef>
+          <a:fillRef idx="1">
+            <a:schemeClr val="accent1"/>
+          </a:fillRef>
+          <a:effectRef idx="0">
+            <a:schemeClr val="accent1"/>
+          </a:effectRef>
+          <a:fontRef idx="minor">
+            <a:schemeClr val="lt1"/>
+          </a:fontRef>
+        </p:style>
+        <p:txBody>
+          <a:bodyPr rtlCol="0" anchor="ctr"/>
+          <a:lstStyle/>
+          <a:p>
+            <a:pPr algn="ctr"/>
+            <a:endParaRPr lang="de-DE" noProof="0" dirty="0"/>
+          </a:p>
+        </p:txBody>
+      </p:sp>
+      <p:sp>
+        <p:nvSpPr>
+          <p:cNvPr id="9" name="Textfeld 8">
+            <a:extLst>
+              <a:ext uri="{FF2B5EF4-FFF2-40B4-BE49-F238E27FC236}">
+                <a16:creationId xmlns:a16="http://schemas.microsoft.com/office/drawing/2014/main" id="{EE46CCE7-4B63-C063-A1A0-FD02093D28EF}"/>
+              </a:ext>
+            </a:extLst>
+          </p:cNvPr>
+          <p:cNvSpPr txBox="1"/>
+          <p:nvPr/>
+        </p:nvSpPr>
+        <p:spPr>
+          <a:xfrm>
+            <a:off x="378530" y="539728"/>
+            <a:ext cx="5668878" cy="727683"/>
+          </a:xfrm>
+          <a:prstGeom prst="rect">
+            <a:avLst/>
+          </a:prstGeom>
+          <a:noFill/>
+        </p:spPr>
+        <p:txBody>
+          <a:bodyPr wrap="square" rtlCol="0">
+            <a:spAutoFit/>
+          </a:bodyPr>
+          <a:lstStyle/>
+          <a:p>
+            <a:r>
+              <a:rPr lang="de-DE" sz="4000" b="1" u="sng" noProof="0" dirty="0"/>
+              <a:t>Preview</a:t>
+            </a:r>
+            <a:endParaRPr lang="de-DE" sz="4000" u="sng" noProof="0" dirty="0"/>
+          </a:p>
+        </p:txBody>
+      </p:sp>
+      <p:sp>
+        <p:nvSpPr>
+          <p:cNvPr id="4" name="Foliennummernplatzhalter 3">
+            <a:extLst>
+              <a:ext uri="{FF2B5EF4-FFF2-40B4-BE49-F238E27FC236}">
+                <a16:creationId xmlns:a16="http://schemas.microsoft.com/office/drawing/2014/main" id="{1FD03C12-9358-71DB-4632-9686FF07BFA5}"/>
+              </a:ext>
+            </a:extLst>
+          </p:cNvPr>
+          <p:cNvSpPr>
+            <a:spLocks noGrp="1"/>
+          </p:cNvSpPr>
+          <p:nvPr>
+            <p:ph type="sldNum" sz="quarter" idx="12"/>
+          </p:nvPr>
+        </p:nvSpPr>
+        <p:spPr/>
+        <p:txBody>
+          <a:bodyPr/>
+          <a:lstStyle/>
+          <a:p>
+            <a:fld id="{0AB081A1-1B31-4B03-A7DA-E9A52B55500E}" type="slidenum">
+              <a:rPr lang="de-DE" sz="1800" b="1" noProof="0" smtClean="0"/>
+              <a:t>22</a:t>
+            </a:fld>
+            <a:endParaRPr lang="de-DE" sz="1800" b="1" noProof="0" dirty="0"/>
+          </a:p>
+        </p:txBody>
+      </p:sp>
+      <p:pic>
+        <p:nvPicPr>
+          <p:cNvPr id="6" name="Grafik 5">
+            <a:extLst>
+              <a:ext uri="{FF2B5EF4-FFF2-40B4-BE49-F238E27FC236}">
+                <a16:creationId xmlns:a16="http://schemas.microsoft.com/office/drawing/2014/main" id="{6115A05E-2957-72FA-6502-8D29ACA03218}"/>
+              </a:ext>
+            </a:extLst>
+          </p:cNvPr>
+          <p:cNvPicPr>
+            <a:picLocks noChangeAspect="1"/>
+          </p:cNvPicPr>
+          <p:nvPr/>
+        </p:nvPicPr>
+        <p:blipFill>
+          <a:blip r:embed="rId2"/>
+          <a:stretch>
+            <a:fillRect/>
+          </a:stretch>
+        </p:blipFill>
+        <p:spPr>
+          <a:xfrm>
+            <a:off x="908922" y="2263995"/>
+            <a:ext cx="5891927" cy="3399447"/>
+          </a:xfrm>
+          <a:prstGeom prst="rect">
+            <a:avLst/>
+          </a:prstGeom>
+        </p:spPr>
+      </p:pic>
+      <p:sp>
+        <p:nvSpPr>
+          <p:cNvPr id="5" name="Textfeld 4">
+            <a:extLst>
+              <a:ext uri="{FF2B5EF4-FFF2-40B4-BE49-F238E27FC236}">
+                <a16:creationId xmlns:a16="http://schemas.microsoft.com/office/drawing/2014/main" id="{908DF8E6-68A6-44A5-EB02-A20D6420FC71}"/>
+              </a:ext>
+            </a:extLst>
+          </p:cNvPr>
+          <p:cNvSpPr txBox="1"/>
+          <p:nvPr/>
+        </p:nvSpPr>
+        <p:spPr>
+          <a:xfrm>
+            <a:off x="8099569" y="2782669"/>
+            <a:ext cx="3765262" cy="923330"/>
+          </a:xfrm>
+          <a:prstGeom prst="rect">
+            <a:avLst/>
+          </a:prstGeom>
+          <a:noFill/>
+        </p:spPr>
+        <p:txBody>
+          <a:bodyPr wrap="none" rtlCol="0">
+            <a:spAutoFit/>
+          </a:bodyPr>
+          <a:lstStyle/>
+          <a:p>
+            <a:pPr marL="285750" indent="-285750">
+              <a:buFont typeface="Arial" panose="020B0604020202020204" pitchFamily="34" charset="0"/>
+              <a:buChar char="•"/>
+            </a:pPr>
+            <a:r>
+              <a:rPr lang="de-DE" dirty="0"/>
+              <a:t>Zuerst </a:t>
+            </a:r>
+            <a:r>
+              <a:rPr lang="de-DE" dirty="0" err="1"/>
+              <a:t>kamera</a:t>
+            </a:r>
+            <a:r>
+              <a:rPr lang="de-DE" dirty="0"/>
+              <a:t> setzen für die MVP</a:t>
+            </a:r>
+          </a:p>
+          <a:p>
+            <a:pPr marL="285750" indent="-285750">
+              <a:buFont typeface="Arial" panose="020B0604020202020204" pitchFamily="34" charset="0"/>
+              <a:buChar char="•"/>
+            </a:pPr>
+            <a:r>
+              <a:rPr lang="de-DE" dirty="0"/>
+              <a:t>Komponente und Lichter je nach</a:t>
+            </a:r>
+          </a:p>
+          <a:p>
+            <a:r>
+              <a:rPr lang="de-DE" dirty="0"/>
+              <a:t>      Objekt </a:t>
+            </a:r>
+            <a:r>
+              <a:rPr lang="de-DE" dirty="0" err="1"/>
+              <a:t>eigenschaften</a:t>
+            </a:r>
+            <a:r>
+              <a:rPr lang="de-DE" dirty="0"/>
+              <a:t> rendern</a:t>
+            </a:r>
+          </a:p>
+        </p:txBody>
+      </p:sp>
+    </p:spTree>
+    <p:extLst>
+      <p:ext uri="{BB962C8B-B14F-4D97-AF65-F5344CB8AC3E}">
+        <p14:creationId xmlns:p14="http://schemas.microsoft.com/office/powerpoint/2010/main" val="3410784540"/>
+      </p:ext>
+    </p:extLst>
+  </p:cSld>
+  <p:clrMapOvr>
+    <a:masterClrMapping/>
+  </p:clrMapOvr>
+</p:sld>
+</file>
+
+<file path=ppt/slides/slide23.xml><?xml version="1.0" encoding="utf-8"?>
+<p:sld xmlns:a="http://schemas.openxmlformats.org/drawingml/2006/main" xmlns:r="http://schemas.openxmlformats.org/officeDocument/2006/relationships" xmlns:p="http://schemas.openxmlformats.org/presentationml/2006/main">
+  <p:cSld>
+    <p:spTree>
+      <p:nvGrpSpPr>
+        <p:cNvPr id="1" name="">
+          <a:extLst>
+            <a:ext uri="{FF2B5EF4-FFF2-40B4-BE49-F238E27FC236}">
+              <a16:creationId xmlns:a16="http://schemas.microsoft.com/office/drawing/2014/main" id="{FFBC187F-DB6C-877A-E7D2-33728327BF10}"/>
+            </a:ext>
+          </a:extLst>
+        </p:cNvPr>
+        <p:cNvGrpSpPr/>
+        <p:nvPr/>
+      </p:nvGrpSpPr>
+      <p:grpSpPr>
+        <a:xfrm>
+          <a:off x="0" y="0"/>
+          <a:ext cx="0" cy="0"/>
+          <a:chOff x="0" y="0"/>
+          <a:chExt cx="0" cy="0"/>
+        </a:xfrm>
+      </p:grpSpPr>
+      <p:sp>
+        <p:nvSpPr>
+          <p:cNvPr id="2" name="Rectangle 1">
+            <a:extLst>
+              <a:ext uri="{FF2B5EF4-FFF2-40B4-BE49-F238E27FC236}">
+                <a16:creationId xmlns:a16="http://schemas.microsoft.com/office/drawing/2014/main" id="{996F92FA-6CF6-07C8-4220-7149266DFE09}"/>
+              </a:ext>
+            </a:extLst>
+          </p:cNvPr>
+          <p:cNvSpPr/>
+          <p:nvPr/>
+        </p:nvSpPr>
+        <p:spPr>
+          <a:xfrm>
+            <a:off x="111833" y="171039"/>
+            <a:ext cx="266697" cy="6479732"/>
+          </a:xfrm>
+          <a:prstGeom prst="rect">
+            <a:avLst/>
+          </a:prstGeom>
+          <a:ln>
+            <a:noFill/>
+          </a:ln>
+        </p:spPr>
+        <p:style>
+          <a:lnRef idx="2">
+            <a:schemeClr val="accent1">
+              <a:shade val="15000"/>
+            </a:schemeClr>
+          </a:lnRef>
+          <a:fillRef idx="1">
+            <a:schemeClr val="accent1"/>
+          </a:fillRef>
+          <a:effectRef idx="0">
+            <a:schemeClr val="accent1"/>
+          </a:effectRef>
+          <a:fontRef idx="minor">
+            <a:schemeClr val="lt1"/>
+          </a:fontRef>
+        </p:style>
+        <p:txBody>
+          <a:bodyPr rtlCol="0" anchor="ctr"/>
+          <a:lstStyle/>
+          <a:p>
+            <a:pPr algn="ctr"/>
+            <a:endParaRPr lang="de-DE" noProof="0" dirty="0"/>
+          </a:p>
+        </p:txBody>
+      </p:sp>
+      <p:sp>
+        <p:nvSpPr>
+          <p:cNvPr id="3" name="Rectangle 2">
+            <a:extLst>
+              <a:ext uri="{FF2B5EF4-FFF2-40B4-BE49-F238E27FC236}">
+                <a16:creationId xmlns:a16="http://schemas.microsoft.com/office/drawing/2014/main" id="{F15968FD-093E-C38F-B712-5F1886A1C2FB}"/>
+              </a:ext>
+            </a:extLst>
+          </p:cNvPr>
+          <p:cNvSpPr/>
+          <p:nvPr/>
+        </p:nvSpPr>
+        <p:spPr>
+          <a:xfrm>
+            <a:off x="111833" y="6447755"/>
+            <a:ext cx="2292347" cy="300771"/>
+          </a:xfrm>
+          <a:prstGeom prst="rect">
+            <a:avLst/>
+          </a:prstGeom>
+          <a:ln>
+            <a:noFill/>
+          </a:ln>
+        </p:spPr>
+        <p:style>
+          <a:lnRef idx="2">
+            <a:schemeClr val="accent1">
+              <a:shade val="15000"/>
+            </a:schemeClr>
+          </a:lnRef>
+          <a:fillRef idx="1">
+            <a:schemeClr val="accent1"/>
+          </a:fillRef>
+          <a:effectRef idx="0">
+            <a:schemeClr val="accent1"/>
+          </a:effectRef>
+          <a:fontRef idx="minor">
+            <a:schemeClr val="lt1"/>
+          </a:fontRef>
+        </p:style>
+        <p:txBody>
+          <a:bodyPr rtlCol="0" anchor="ctr"/>
+          <a:lstStyle/>
+          <a:p>
+            <a:pPr algn="ctr"/>
+            <a:endParaRPr lang="de-DE" noProof="0" dirty="0"/>
+          </a:p>
+        </p:txBody>
+      </p:sp>
+      <p:sp>
+        <p:nvSpPr>
+          <p:cNvPr id="9" name="Textfeld 8">
+            <a:extLst>
+              <a:ext uri="{FF2B5EF4-FFF2-40B4-BE49-F238E27FC236}">
+                <a16:creationId xmlns:a16="http://schemas.microsoft.com/office/drawing/2014/main" id="{2AB91B33-3A53-A4E1-144B-7C6DDCDFBC42}"/>
+              </a:ext>
+            </a:extLst>
+          </p:cNvPr>
+          <p:cNvSpPr txBox="1"/>
+          <p:nvPr/>
+        </p:nvSpPr>
+        <p:spPr>
+          <a:xfrm>
+            <a:off x="378530" y="539728"/>
+            <a:ext cx="5668878" cy="727683"/>
+          </a:xfrm>
+          <a:prstGeom prst="rect">
+            <a:avLst/>
+          </a:prstGeom>
+          <a:noFill/>
+        </p:spPr>
+        <p:txBody>
+          <a:bodyPr wrap="square" rtlCol="0">
+            <a:spAutoFit/>
+          </a:bodyPr>
+          <a:lstStyle/>
+          <a:p>
+            <a:r>
+              <a:rPr lang="de-DE" sz="4000" b="1" u="sng" noProof="0" dirty="0"/>
+              <a:t>Preview</a:t>
+            </a:r>
+            <a:endParaRPr lang="de-DE" sz="4000" u="sng" noProof="0" dirty="0"/>
+          </a:p>
+        </p:txBody>
+      </p:sp>
+      <p:sp>
+        <p:nvSpPr>
+          <p:cNvPr id="4" name="Foliennummernplatzhalter 3">
+            <a:extLst>
+              <a:ext uri="{FF2B5EF4-FFF2-40B4-BE49-F238E27FC236}">
+                <a16:creationId xmlns:a16="http://schemas.microsoft.com/office/drawing/2014/main" id="{9DB60296-0B66-2FAF-834C-1B780F75AF28}"/>
+              </a:ext>
+            </a:extLst>
+          </p:cNvPr>
+          <p:cNvSpPr>
+            <a:spLocks noGrp="1"/>
+          </p:cNvSpPr>
+          <p:nvPr>
+            <p:ph type="sldNum" sz="quarter" idx="12"/>
+          </p:nvPr>
+        </p:nvSpPr>
+        <p:spPr/>
+        <p:txBody>
+          <a:bodyPr/>
+          <a:lstStyle/>
+          <a:p>
+            <a:fld id="{0AB081A1-1B31-4B03-A7DA-E9A52B55500E}" type="slidenum">
+              <a:rPr lang="de-DE" sz="1800" b="1" noProof="0" smtClean="0"/>
+              <a:t>23</a:t>
+            </a:fld>
+            <a:endParaRPr lang="de-DE" sz="1800" b="1" noProof="0" dirty="0"/>
+          </a:p>
+        </p:txBody>
+      </p:sp>
+      <p:sp>
+        <p:nvSpPr>
+          <p:cNvPr id="5" name="Textfeld 4">
+            <a:extLst>
+              <a:ext uri="{FF2B5EF4-FFF2-40B4-BE49-F238E27FC236}">
+                <a16:creationId xmlns:a16="http://schemas.microsoft.com/office/drawing/2014/main" id="{C9F1D2B0-4295-8AD8-5065-A4C8C872041B}"/>
+              </a:ext>
+            </a:extLst>
+          </p:cNvPr>
+          <p:cNvSpPr txBox="1"/>
+          <p:nvPr/>
+        </p:nvSpPr>
+        <p:spPr>
+          <a:xfrm>
+            <a:off x="4425043" y="2179864"/>
+            <a:ext cx="2812437" cy="1200329"/>
+          </a:xfrm>
+          <a:prstGeom prst="rect">
+            <a:avLst/>
+          </a:prstGeom>
+          <a:noFill/>
+        </p:spPr>
+        <p:txBody>
+          <a:bodyPr wrap="none" rtlCol="0">
+            <a:spAutoFit/>
+          </a:bodyPr>
+          <a:lstStyle/>
+          <a:p>
+            <a:r>
+              <a:rPr lang="de-DE" dirty="0"/>
+              <a:t>Zum einfügen</a:t>
+            </a:r>
+            <a:br>
+              <a:rPr lang="de-DE" dirty="0"/>
+            </a:br>
+            <a:r>
+              <a:rPr lang="de-DE" dirty="0"/>
+              <a:t>Scene vor dem </a:t>
+            </a:r>
+            <a:r>
+              <a:rPr lang="de-DE" dirty="0" err="1"/>
+              <a:t>raytracen</a:t>
+            </a:r>
+            <a:br>
+              <a:rPr lang="de-DE" dirty="0"/>
+            </a:br>
+            <a:r>
+              <a:rPr lang="de-DE" dirty="0" err="1"/>
+              <a:t>scene</a:t>
+            </a:r>
+            <a:r>
+              <a:rPr lang="de-DE" dirty="0"/>
+              <a:t> nach dem </a:t>
+            </a:r>
+            <a:r>
+              <a:rPr lang="de-DE" dirty="0" err="1"/>
+              <a:t>raytracen</a:t>
+            </a:r>
+            <a:endParaRPr lang="de-DE" dirty="0"/>
+          </a:p>
+          <a:p>
+            <a:r>
+              <a:rPr lang="de-DE" dirty="0"/>
+              <a:t>(mit </a:t>
+            </a:r>
+            <a:r>
+              <a:rPr lang="de-DE" dirty="0" err="1"/>
+              <a:t>nem</a:t>
+            </a:r>
+            <a:r>
+              <a:rPr lang="de-DE" dirty="0"/>
+              <a:t> </a:t>
+            </a:r>
+            <a:r>
+              <a:rPr lang="de-DE" dirty="0" err="1"/>
+              <a:t>pfeil</a:t>
+            </a:r>
+            <a:r>
+              <a:rPr lang="de-DE" dirty="0"/>
+              <a:t> </a:t>
+            </a:r>
+            <a:r>
+              <a:rPr lang="de-DE" dirty="0" err="1"/>
+              <a:t>evtl</a:t>
+            </a:r>
+            <a:r>
+              <a:rPr lang="de-DE" dirty="0"/>
+              <a:t>? </a:t>
+            </a:r>
+            <a:r>
+              <a:rPr lang="de-DE" dirty="0" err="1"/>
+              <a:t>idk</a:t>
+            </a:r>
+            <a:r>
+              <a:rPr lang="de-DE" dirty="0"/>
+              <a:t>)</a:t>
+            </a:r>
+          </a:p>
+        </p:txBody>
+      </p:sp>
+    </p:spTree>
+    <p:extLst>
+      <p:ext uri="{BB962C8B-B14F-4D97-AF65-F5344CB8AC3E}">
+        <p14:creationId xmlns:p14="http://schemas.microsoft.com/office/powerpoint/2010/main" val="3571408936"/>
+      </p:ext>
+    </p:extLst>
+  </p:cSld>
+  <p:clrMapOvr>
+    <a:masterClrMapping/>
+  </p:clrMapOvr>
+</p:sld>
+</file>
+
+<file path=ppt/slides/slide24.xml><?xml version="1.0" encoding="utf-8"?>
+<p:sld xmlns:a="http://schemas.openxmlformats.org/drawingml/2006/main" xmlns:r="http://schemas.openxmlformats.org/officeDocument/2006/relationships" xmlns:p="http://schemas.openxmlformats.org/presentationml/2006/main">
+  <p:cSld>
     <p:bg>
       <p:bgPr>
         <a:solidFill>
@@ -9982,316 +11943,6 @@
     <p:extLst>
       <p:ext uri="{BB962C8B-B14F-4D97-AF65-F5344CB8AC3E}">
         <p14:creationId xmlns:p14="http://schemas.microsoft.com/office/powerpoint/2010/main" val="3495534188"/>
-      </p:ext>
-    </p:extLst>
-  </p:cSld>
-  <p:clrMapOvr>
-    <a:masterClrMapping/>
-  </p:clrMapOvr>
-</p:sld>
-</file>
-
-<file path=ppt/slides/slide2.xml><?xml version="1.0" encoding="utf-8"?>
-<p:sld xmlns:a="http://schemas.openxmlformats.org/drawingml/2006/main" xmlns:r="http://schemas.openxmlformats.org/officeDocument/2006/relationships" xmlns:p="http://schemas.openxmlformats.org/presentationml/2006/main">
-  <p:cSld>
-    <p:spTree>
-      <p:nvGrpSpPr>
-        <p:cNvPr id="1" name="">
-          <a:extLst>
-            <a:ext uri="{FF2B5EF4-FFF2-40B4-BE49-F238E27FC236}">
-              <a16:creationId xmlns:a16="http://schemas.microsoft.com/office/drawing/2014/main" id="{7FFB18E0-896F-9472-E42D-1120B56BE792}"/>
-            </a:ext>
-          </a:extLst>
-        </p:cNvPr>
-        <p:cNvGrpSpPr/>
-        <p:nvPr/>
-      </p:nvGrpSpPr>
-      <p:grpSpPr>
-        <a:xfrm>
-          <a:off x="0" y="0"/>
-          <a:ext cx="0" cy="0"/>
-          <a:chOff x="0" y="0"/>
-          <a:chExt cx="0" cy="0"/>
-        </a:xfrm>
-      </p:grpSpPr>
-      <p:sp>
-        <p:nvSpPr>
-          <p:cNvPr id="2" name="Rectangle 1">
-            <a:extLst>
-              <a:ext uri="{FF2B5EF4-FFF2-40B4-BE49-F238E27FC236}">
-                <a16:creationId xmlns:a16="http://schemas.microsoft.com/office/drawing/2014/main" id="{2D40B634-9F89-E79F-F6E1-7F062E3C60A4}"/>
-              </a:ext>
-            </a:extLst>
-          </p:cNvPr>
-          <p:cNvSpPr/>
-          <p:nvPr/>
-        </p:nvSpPr>
-        <p:spPr>
-          <a:xfrm>
-            <a:off x="111833" y="171039"/>
-            <a:ext cx="266697" cy="6479732"/>
-          </a:xfrm>
-          <a:prstGeom prst="rect">
-            <a:avLst/>
-          </a:prstGeom>
-          <a:ln>
-            <a:noFill/>
-          </a:ln>
-        </p:spPr>
-        <p:style>
-          <a:lnRef idx="2">
-            <a:schemeClr val="accent1">
-              <a:shade val="15000"/>
-            </a:schemeClr>
-          </a:lnRef>
-          <a:fillRef idx="1">
-            <a:schemeClr val="accent1"/>
-          </a:fillRef>
-          <a:effectRef idx="0">
-            <a:schemeClr val="accent1"/>
-          </a:effectRef>
-          <a:fontRef idx="minor">
-            <a:schemeClr val="lt1"/>
-          </a:fontRef>
-        </p:style>
-        <p:txBody>
-          <a:bodyPr rtlCol="0" anchor="ctr"/>
-          <a:lstStyle/>
-          <a:p>
-            <a:pPr algn="ctr"/>
-            <a:endParaRPr lang="de-DE" noProof="0" dirty="0"/>
-          </a:p>
-        </p:txBody>
-      </p:sp>
-      <p:sp>
-        <p:nvSpPr>
-          <p:cNvPr id="3" name="Rectangle 2">
-            <a:extLst>
-              <a:ext uri="{FF2B5EF4-FFF2-40B4-BE49-F238E27FC236}">
-                <a16:creationId xmlns:a16="http://schemas.microsoft.com/office/drawing/2014/main" id="{FECE32A8-C401-9A65-FF67-5C1C853D0643}"/>
-              </a:ext>
-            </a:extLst>
-          </p:cNvPr>
-          <p:cNvSpPr/>
-          <p:nvPr/>
-        </p:nvSpPr>
-        <p:spPr>
-          <a:xfrm>
-            <a:off x="111833" y="6447755"/>
-            <a:ext cx="2292347" cy="300771"/>
-          </a:xfrm>
-          <a:prstGeom prst="rect">
-            <a:avLst/>
-          </a:prstGeom>
-          <a:ln>
-            <a:noFill/>
-          </a:ln>
-        </p:spPr>
-        <p:style>
-          <a:lnRef idx="2">
-            <a:schemeClr val="accent1">
-              <a:shade val="15000"/>
-            </a:schemeClr>
-          </a:lnRef>
-          <a:fillRef idx="1">
-            <a:schemeClr val="accent1"/>
-          </a:fillRef>
-          <a:effectRef idx="0">
-            <a:schemeClr val="accent1"/>
-          </a:effectRef>
-          <a:fontRef idx="minor">
-            <a:schemeClr val="lt1"/>
-          </a:fontRef>
-        </p:style>
-        <p:txBody>
-          <a:bodyPr rtlCol="0" anchor="ctr"/>
-          <a:lstStyle/>
-          <a:p>
-            <a:pPr algn="ctr"/>
-            <a:endParaRPr lang="de-DE" noProof="0" dirty="0"/>
-          </a:p>
-        </p:txBody>
-      </p:sp>
-      <p:sp>
-        <p:nvSpPr>
-          <p:cNvPr id="4" name="Titel 3">
-            <a:extLst>
-              <a:ext uri="{FF2B5EF4-FFF2-40B4-BE49-F238E27FC236}">
-                <a16:creationId xmlns:a16="http://schemas.microsoft.com/office/drawing/2014/main" id="{F919FCE7-CD6A-EEA6-EB3C-2499DBE31C54}"/>
-              </a:ext>
-            </a:extLst>
-          </p:cNvPr>
-          <p:cNvSpPr>
-            <a:spLocks noGrp="1"/>
-          </p:cNvSpPr>
-          <p:nvPr>
-            <p:ph type="ctrTitle"/>
-          </p:nvPr>
-        </p:nvSpPr>
-        <p:spPr/>
-        <p:txBody>
-          <a:bodyPr/>
-          <a:lstStyle/>
-          <a:p>
-            <a:r>
-              <a:rPr lang="de-DE" b="1" noProof="0" dirty="0"/>
-              <a:t>Workflows</a:t>
-            </a:r>
-          </a:p>
-        </p:txBody>
-      </p:sp>
-      <p:grpSp>
-        <p:nvGrpSpPr>
-          <p:cNvPr id="10" name="Gruppieren 9">
-            <a:extLst>
-              <a:ext uri="{FF2B5EF4-FFF2-40B4-BE49-F238E27FC236}">
-                <a16:creationId xmlns:a16="http://schemas.microsoft.com/office/drawing/2014/main" id="{AD0F9347-AEE0-F73F-E02F-1371ABB5C4E1}"/>
-              </a:ext>
-            </a:extLst>
-          </p:cNvPr>
-          <p:cNvGrpSpPr/>
-          <p:nvPr/>
-        </p:nvGrpSpPr>
-        <p:grpSpPr>
-          <a:xfrm rot="10800000">
-            <a:off x="9787820" y="171039"/>
-            <a:ext cx="2292347" cy="6577487"/>
-            <a:chOff x="9738433" y="171039"/>
-            <a:chExt cx="2292347" cy="6577487"/>
-          </a:xfrm>
-        </p:grpSpPr>
-        <p:sp>
-          <p:nvSpPr>
-            <p:cNvPr id="8" name="Rectangle 1">
-              <a:extLst>
-                <a:ext uri="{FF2B5EF4-FFF2-40B4-BE49-F238E27FC236}">
-                  <a16:creationId xmlns:a16="http://schemas.microsoft.com/office/drawing/2014/main" id="{120EFAEC-5083-CED9-400D-A5A126B2EFE0}"/>
-                </a:ext>
-              </a:extLst>
-            </p:cNvPr>
-            <p:cNvSpPr/>
-            <p:nvPr/>
-          </p:nvSpPr>
-          <p:spPr>
-            <a:xfrm>
-              <a:off x="9738433" y="171039"/>
-              <a:ext cx="266697" cy="6479732"/>
-            </a:xfrm>
-            <a:prstGeom prst="rect">
-              <a:avLst/>
-            </a:prstGeom>
-            <a:ln>
-              <a:noFill/>
-            </a:ln>
-          </p:spPr>
-          <p:style>
-            <a:lnRef idx="2">
-              <a:schemeClr val="accent1">
-                <a:shade val="15000"/>
-              </a:schemeClr>
-            </a:lnRef>
-            <a:fillRef idx="1">
-              <a:schemeClr val="accent1"/>
-            </a:fillRef>
-            <a:effectRef idx="0">
-              <a:schemeClr val="accent1"/>
-            </a:effectRef>
-            <a:fontRef idx="minor">
-              <a:schemeClr val="lt1"/>
-            </a:fontRef>
-          </p:style>
-          <p:txBody>
-            <a:bodyPr rtlCol="0" anchor="ctr"/>
-            <a:lstStyle/>
-            <a:p>
-              <a:pPr algn="ctr"/>
-              <a:endParaRPr lang="de-DE" noProof="0" dirty="0"/>
-            </a:p>
-          </p:txBody>
-        </p:sp>
-        <p:sp>
-          <p:nvSpPr>
-            <p:cNvPr id="9" name="Rectangle 2">
-              <a:extLst>
-                <a:ext uri="{FF2B5EF4-FFF2-40B4-BE49-F238E27FC236}">
-                  <a16:creationId xmlns:a16="http://schemas.microsoft.com/office/drawing/2014/main" id="{F320EC1B-A2E2-5E81-3678-1F755671021A}"/>
-                </a:ext>
-              </a:extLst>
-            </p:cNvPr>
-            <p:cNvSpPr/>
-            <p:nvPr/>
-          </p:nvSpPr>
-          <p:spPr>
-            <a:xfrm>
-              <a:off x="9738433" y="6447755"/>
-              <a:ext cx="2292347" cy="300771"/>
-            </a:xfrm>
-            <a:prstGeom prst="rect">
-              <a:avLst/>
-            </a:prstGeom>
-            <a:ln>
-              <a:noFill/>
-            </a:ln>
-          </p:spPr>
-          <p:style>
-            <a:lnRef idx="2">
-              <a:schemeClr val="accent1">
-                <a:shade val="15000"/>
-              </a:schemeClr>
-            </a:lnRef>
-            <a:fillRef idx="1">
-              <a:schemeClr val="accent1"/>
-            </a:fillRef>
-            <a:effectRef idx="0">
-              <a:schemeClr val="accent1"/>
-            </a:effectRef>
-            <a:fontRef idx="minor">
-              <a:schemeClr val="lt1"/>
-            </a:fontRef>
-          </p:style>
-          <p:txBody>
-            <a:bodyPr rtlCol="0" anchor="ctr"/>
-            <a:lstStyle/>
-            <a:p>
-              <a:pPr algn="ctr"/>
-              <a:endParaRPr lang="de-DE" noProof="0" dirty="0"/>
-            </a:p>
-          </p:txBody>
-        </p:sp>
-      </p:grpSp>
-      <p:sp>
-        <p:nvSpPr>
-          <p:cNvPr id="5" name="Foliennummernplatzhalter 4">
-            <a:extLst>
-              <a:ext uri="{FF2B5EF4-FFF2-40B4-BE49-F238E27FC236}">
-                <a16:creationId xmlns:a16="http://schemas.microsoft.com/office/drawing/2014/main" id="{E780EFBD-5D2E-4FF4-36EC-5B53C797BAED}"/>
-              </a:ext>
-            </a:extLst>
-          </p:cNvPr>
-          <p:cNvSpPr>
-            <a:spLocks noGrp="1"/>
-          </p:cNvSpPr>
-          <p:nvPr>
-            <p:ph type="sldNum" sz="quarter" idx="12"/>
-          </p:nvPr>
-        </p:nvSpPr>
-        <p:spPr/>
-        <p:txBody>
-          <a:bodyPr/>
-          <a:lstStyle/>
-          <a:p>
-            <a:fld id="{0AB081A1-1B31-4B03-A7DA-E9A52B55500E}" type="slidenum">
-              <a:rPr lang="de-DE" sz="1800" b="1" noProof="0" smtClean="0"/>
-              <a:t>2</a:t>
-            </a:fld>
-            <a:endParaRPr lang="de-DE" sz="1800" b="1" noProof="0" dirty="0"/>
-          </a:p>
-        </p:txBody>
-      </p:sp>
-    </p:spTree>
-    <p:extLst>
-      <p:ext uri="{BB962C8B-B14F-4D97-AF65-F5344CB8AC3E}">
-        <p14:creationId xmlns:p14="http://schemas.microsoft.com/office/powerpoint/2010/main" val="3610997094"/>
       </p:ext>
     </p:extLst>
   </p:cSld>

</xml_diff>

<commit_message>
04_Team_RayForge_Release_Technische-Präsentation.pptx : bild hinzugefügt
</commit_message>
<xml_diff>
--- a/2. Präsentation/2.1 Präsentationsunterlagen/04_Team_RayForge_Release_Technische-Präsentation.pptx
+++ b/2. Präsentation/2.1 Präsentationsunterlagen/04_Team_RayForge_Release_Technische-Präsentation.pptx
@@ -11320,106 +11320,66 @@
           </a:p>
         </p:txBody>
       </p:sp>
-      <p:sp>
-        <p:nvSpPr>
-          <p:cNvPr id="5" name="Textfeld 4">
+      <p:pic>
+        <p:nvPicPr>
+          <p:cNvPr id="7" name="Grafik 6">
             <a:extLst>
               <a:ext uri="{FF2B5EF4-FFF2-40B4-BE49-F238E27FC236}">
-                <a16:creationId xmlns:a16="http://schemas.microsoft.com/office/drawing/2014/main" id="{C9F1D2B0-4295-8AD8-5065-A4C8C872041B}"/>
+                <a16:creationId xmlns:a16="http://schemas.microsoft.com/office/drawing/2014/main" id="{8149584F-18AF-8FD6-C05E-E33BF63217C7}"/>
               </a:ext>
             </a:extLst>
           </p:cNvPr>
-          <p:cNvSpPr txBox="1"/>
+          <p:cNvPicPr>
+            <a:picLocks noChangeAspect="1"/>
+          </p:cNvPicPr>
           <p:nvPr/>
-        </p:nvSpPr>
-        <p:spPr>
-          <a:xfrm>
-            <a:off x="4425043" y="2179864"/>
-            <a:ext cx="2812437" cy="1200329"/>
+        </p:nvPicPr>
+        <p:blipFill>
+          <a:blip r:embed="rId2"/>
+          <a:stretch>
+            <a:fillRect/>
+          </a:stretch>
+        </p:blipFill>
+        <p:spPr>
+          <a:xfrm>
+            <a:off x="642015" y="2077702"/>
+            <a:ext cx="4439777" cy="3559762"/>
           </a:xfrm>
           <a:prstGeom prst="rect">
             <a:avLst/>
           </a:prstGeom>
-          <a:noFill/>
-        </p:spPr>
-        <p:txBody>
-          <a:bodyPr wrap="none" rtlCol="0">
-            <a:spAutoFit/>
-          </a:bodyPr>
-          <a:lstStyle/>
-          <a:p>
-            <a:r>
-              <a:rPr lang="de-DE" dirty="0"/>
-              <a:t>Zum einfügen</a:t>
-            </a:r>
-            <a:br>
-              <a:rPr lang="de-DE" dirty="0"/>
-            </a:br>
-            <a:r>
-              <a:rPr lang="de-DE" dirty="0"/>
-              <a:t>Scene vor dem </a:t>
-            </a:r>
-            <a:r>
-              <a:rPr lang="de-DE" dirty="0" err="1"/>
-              <a:t>raytracen</a:t>
-            </a:r>
-            <a:br>
-              <a:rPr lang="de-DE" dirty="0"/>
-            </a:br>
-            <a:r>
-              <a:rPr lang="de-DE" dirty="0" err="1"/>
-              <a:t>scene</a:t>
-            </a:r>
-            <a:r>
-              <a:rPr lang="de-DE" dirty="0"/>
-              <a:t> nach dem </a:t>
-            </a:r>
-            <a:r>
-              <a:rPr lang="de-DE" dirty="0" err="1"/>
-              <a:t>raytracen</a:t>
-            </a:r>
-            <a:endParaRPr lang="de-DE" dirty="0"/>
-          </a:p>
-          <a:p>
-            <a:r>
-              <a:rPr lang="de-DE" dirty="0"/>
-              <a:t>(mit </a:t>
-            </a:r>
-            <a:r>
-              <a:rPr lang="de-DE" dirty="0" err="1"/>
-              <a:t>nem</a:t>
-            </a:r>
-            <a:r>
-              <a:rPr lang="de-DE" dirty="0"/>
-              <a:t> </a:t>
-            </a:r>
-            <a:r>
-              <a:rPr lang="de-DE" dirty="0" err="1"/>
-              <a:t>pfeil</a:t>
-            </a:r>
-            <a:r>
-              <a:rPr lang="de-DE" dirty="0"/>
-              <a:t> </a:t>
-            </a:r>
-            <a:r>
-              <a:rPr lang="de-DE" dirty="0" err="1"/>
-              <a:t>evtl</a:t>
-            </a:r>
-            <a:r>
-              <a:rPr lang="de-DE" dirty="0"/>
-              <a:t>? </a:t>
-            </a:r>
-            <a:r>
-              <a:rPr lang="de-DE" dirty="0" err="1"/>
-              <a:t>idk</a:t>
-            </a:r>
-            <a:r>
-              <a:rPr lang="de-DE" dirty="0"/>
-              <a:t>)</a:t>
-            </a:r>
-          </a:p>
-        </p:txBody>
-      </p:sp>
+        </p:spPr>
+      </p:pic>
+      <p:pic>
+        <p:nvPicPr>
+          <p:cNvPr id="10" name="Grafik 9">
+            <a:extLst>
+              <a:ext uri="{FF2B5EF4-FFF2-40B4-BE49-F238E27FC236}">
+                <a16:creationId xmlns:a16="http://schemas.microsoft.com/office/drawing/2014/main" id="{E5912E29-EB17-F3C4-13FC-48E192BC1616}"/>
+              </a:ext>
+            </a:extLst>
+          </p:cNvPr>
+          <p:cNvPicPr>
+            <a:picLocks noChangeAspect="1"/>
+          </p:cNvPicPr>
+          <p:nvPr/>
+        </p:nvPicPr>
+        <p:blipFill>
+          <a:blip r:embed="rId3"/>
+          <a:stretch>
+            <a:fillRect/>
+          </a:stretch>
+        </p:blipFill>
+        <p:spPr>
+          <a:xfrm>
+            <a:off x="5795290" y="2077702"/>
+            <a:ext cx="6163473" cy="3559762"/>
+          </a:xfrm>
+          <a:prstGeom prst="rect">
+            <a:avLst/>
+          </a:prstGeom>
+        </p:spPr>
+      </p:pic>
     </p:spTree>
     <p:extLst>
       <p:ext uri="{BB962C8B-B14F-4D97-AF65-F5344CB8AC3E}">

</xml_diff>